<commit_message>
exercises.html all-slides.pdf decorators.pdf decorators.pptx dynamic_programming.pdf dynamic_programming.pptx
</commit_message>
<xml_diff>
--- a/ipsa/slides/decorators.pptx
+++ b/ipsa/slides/decorators.pptx
@@ -134,161 +134,8 @@
 </p:presentation>
 </file>
 
-<file path=ppt/revisionInfo.xml><?xml version="1.0" encoding="utf-8"?>
-<p1510:revInfo xmlns:a="http://schemas.openxmlformats.org/drawingml/2006/main" xmlns:r="http://schemas.openxmlformats.org/officeDocument/2006/relationships" xmlns:p1510="http://schemas.microsoft.com/office/powerpoint/2015/10/main">
-  <p1510:revLst>
-    <p1510:client id="{49DDEC1E-38A8-4C37-8499-4049F935AE5A}" v="6" dt="2023-03-10T23:54:40.289"/>
-  </p1510:revLst>
-</p1510:revInfo>
-</file>
-
 <file path=ppt/changesInfos/changesInfo1.xml><?xml version="1.0" encoding="utf-8"?>
 <pc:chgInfo xmlns:a="http://schemas.openxmlformats.org/drawingml/2006/main" xmlns:r="http://schemas.openxmlformats.org/officeDocument/2006/relationships" xmlns:ac="http://schemas.microsoft.com/office/drawing/2013/main/command" xmlns:pc="http://schemas.microsoft.com/office/powerpoint/2013/main/command">
-  <pc:docChgLst>
-    <pc:chgData name="Gerth Stølting Brodal" userId="04ef4784-6591-4f86-a140-f5c3b108582a" providerId="ADAL" clId="{49DDEC1E-38A8-4C37-8499-4049F935AE5A}"/>
-    <pc:docChg chg="undo redo custSel modSld">
-      <pc:chgData name="Gerth Stølting Brodal" userId="04ef4784-6591-4f86-a140-f5c3b108582a" providerId="ADAL" clId="{49DDEC1E-38A8-4C37-8499-4049F935AE5A}" dt="2023-03-20T07:23:13.100" v="322" actId="1036"/>
-      <pc:docMkLst>
-        <pc:docMk/>
-      </pc:docMkLst>
-      <pc:sldChg chg="modSp mod modNotesTx">
-        <pc:chgData name="Gerth Stølting Brodal" userId="04ef4784-6591-4f86-a140-f5c3b108582a" providerId="ADAL" clId="{49DDEC1E-38A8-4C37-8499-4049F935AE5A}" dt="2023-03-20T07:23:13.100" v="322" actId="1036"/>
-        <pc:sldMkLst>
-          <pc:docMk/>
-          <pc:sldMk cId="1986006132" sldId="478"/>
-        </pc:sldMkLst>
-        <pc:spChg chg="mod">
-          <ac:chgData name="Gerth Stølting Brodal" userId="04ef4784-6591-4f86-a140-f5c3b108582a" providerId="ADAL" clId="{49DDEC1E-38A8-4C37-8499-4049F935AE5A}" dt="2023-03-20T07:23:13.100" v="322" actId="1036"/>
-          <ac:spMkLst>
-            <pc:docMk/>
-            <pc:sldMk cId="1986006132" sldId="478"/>
-            <ac:spMk id="2" creationId="{00000000-0000-0000-0000-000000000000}"/>
-          </ac:spMkLst>
-        </pc:spChg>
-      </pc:sldChg>
-      <pc:sldChg chg="modNotesTx">
-        <pc:chgData name="Gerth Stølting Brodal" userId="04ef4784-6591-4f86-a140-f5c3b108582a" providerId="ADAL" clId="{49DDEC1E-38A8-4C37-8499-4049F935AE5A}" dt="2023-03-18T02:06:20.087" v="278" actId="20577"/>
-        <pc:sldMkLst>
-          <pc:docMk/>
-          <pc:sldMk cId="27977411" sldId="742"/>
-        </pc:sldMkLst>
-      </pc:sldChg>
-      <pc:sldChg chg="modSp mod">
-        <pc:chgData name="Gerth Stølting Brodal" userId="04ef4784-6591-4f86-a140-f5c3b108582a" providerId="ADAL" clId="{49DDEC1E-38A8-4C37-8499-4049F935AE5A}" dt="2023-03-10T23:46:02.009" v="21" actId="6549"/>
-        <pc:sldMkLst>
-          <pc:docMk/>
-          <pc:sldMk cId="4266574988" sldId="743"/>
-        </pc:sldMkLst>
-        <pc:graphicFrameChg chg="mod modGraphic">
-          <ac:chgData name="Gerth Stølting Brodal" userId="04ef4784-6591-4f86-a140-f5c3b108582a" providerId="ADAL" clId="{49DDEC1E-38A8-4C37-8499-4049F935AE5A}" dt="2023-03-10T23:46:02.009" v="21" actId="6549"/>
-          <ac:graphicFrameMkLst>
-            <pc:docMk/>
-            <pc:sldMk cId="4266574988" sldId="743"/>
-            <ac:graphicFrameMk id="4" creationId="{00000000-0000-0000-0000-000000000000}"/>
-          </ac:graphicFrameMkLst>
-        </pc:graphicFrameChg>
-      </pc:sldChg>
-      <pc:sldChg chg="modSp mod">
-        <pc:chgData name="Gerth Stølting Brodal" userId="04ef4784-6591-4f86-a140-f5c3b108582a" providerId="ADAL" clId="{49DDEC1E-38A8-4C37-8499-4049F935AE5A}" dt="2023-03-10T23:48:00.193" v="41" actId="313"/>
-        <pc:sldMkLst>
-          <pc:docMk/>
-          <pc:sldMk cId="2191884848" sldId="753"/>
-        </pc:sldMkLst>
-        <pc:graphicFrameChg chg="modGraphic">
-          <ac:chgData name="Gerth Stølting Brodal" userId="04ef4784-6591-4f86-a140-f5c3b108582a" providerId="ADAL" clId="{49DDEC1E-38A8-4C37-8499-4049F935AE5A}" dt="2023-03-10T23:47:58.314" v="39" actId="313"/>
-          <ac:graphicFrameMkLst>
-            <pc:docMk/>
-            <pc:sldMk cId="2191884848" sldId="753"/>
-            <ac:graphicFrameMk id="4" creationId="{00000000-0000-0000-0000-000000000000}"/>
-          </ac:graphicFrameMkLst>
-        </pc:graphicFrameChg>
-        <pc:graphicFrameChg chg="modGraphic">
-          <ac:chgData name="Gerth Stølting Brodal" userId="04ef4784-6591-4f86-a140-f5c3b108582a" providerId="ADAL" clId="{49DDEC1E-38A8-4C37-8499-4049F935AE5A}" dt="2023-03-10T23:48:00.193" v="41" actId="313"/>
-          <ac:graphicFrameMkLst>
-            <pc:docMk/>
-            <pc:sldMk cId="2191884848" sldId="753"/>
-            <ac:graphicFrameMk id="5" creationId="{00000000-0000-0000-0000-000000000000}"/>
-          </ac:graphicFrameMkLst>
-        </pc:graphicFrameChg>
-      </pc:sldChg>
-      <pc:sldChg chg="modSp mod addAnim delAnim">
-        <pc:chgData name="Gerth Stølting Brodal" userId="04ef4784-6591-4f86-a140-f5c3b108582a" providerId="ADAL" clId="{49DDEC1E-38A8-4C37-8499-4049F935AE5A}" dt="2023-03-10T23:46:58.878" v="37" actId="313"/>
-        <pc:sldMkLst>
-          <pc:docMk/>
-          <pc:sldMk cId="276098007" sldId="757"/>
-        </pc:sldMkLst>
-        <pc:graphicFrameChg chg="modGraphic">
-          <ac:chgData name="Gerth Stølting Brodal" userId="04ef4784-6591-4f86-a140-f5c3b108582a" providerId="ADAL" clId="{49DDEC1E-38A8-4C37-8499-4049F935AE5A}" dt="2023-03-10T23:46:36.216" v="31" actId="6549"/>
-          <ac:graphicFrameMkLst>
-            <pc:docMk/>
-            <pc:sldMk cId="276098007" sldId="757"/>
-            <ac:graphicFrameMk id="4" creationId="{00000000-0000-0000-0000-000000000000}"/>
-          </ac:graphicFrameMkLst>
-        </pc:graphicFrameChg>
-        <pc:graphicFrameChg chg="modGraphic">
-          <ac:chgData name="Gerth Stølting Brodal" userId="04ef4784-6591-4f86-a140-f5c3b108582a" providerId="ADAL" clId="{49DDEC1E-38A8-4C37-8499-4049F935AE5A}" dt="2023-03-10T23:46:58.878" v="37" actId="313"/>
-          <ac:graphicFrameMkLst>
-            <pc:docMk/>
-            <pc:sldMk cId="276098007" sldId="757"/>
-            <ac:graphicFrameMk id="5" creationId="{00000000-0000-0000-0000-000000000000}"/>
-          </ac:graphicFrameMkLst>
-        </pc:graphicFrameChg>
-      </pc:sldChg>
-      <pc:sldChg chg="modSp mod">
-        <pc:chgData name="Gerth Stølting Brodal" userId="04ef4784-6591-4f86-a140-f5c3b108582a" providerId="ADAL" clId="{49DDEC1E-38A8-4C37-8499-4049F935AE5A}" dt="2023-03-10T23:55:09.257" v="75" actId="20577"/>
-        <pc:sldMkLst>
-          <pc:docMk/>
-          <pc:sldMk cId="886526213" sldId="759"/>
-        </pc:sldMkLst>
-        <pc:graphicFrameChg chg="mod modGraphic">
-          <ac:chgData name="Gerth Stølting Brodal" userId="04ef4784-6591-4f86-a140-f5c3b108582a" providerId="ADAL" clId="{49DDEC1E-38A8-4C37-8499-4049F935AE5A}" dt="2023-03-10T23:55:09.257" v="75" actId="20577"/>
-          <ac:graphicFrameMkLst>
-            <pc:docMk/>
-            <pc:sldMk cId="886526213" sldId="759"/>
-            <ac:graphicFrameMk id="4" creationId="{00000000-0000-0000-0000-000000000000}"/>
-          </ac:graphicFrameMkLst>
-        </pc:graphicFrameChg>
-      </pc:sldChg>
-      <pc:sldChg chg="modNotesTx">
-        <pc:chgData name="Gerth Stølting Brodal" userId="04ef4784-6591-4f86-a140-f5c3b108582a" providerId="ADAL" clId="{49DDEC1E-38A8-4C37-8499-4049F935AE5A}" dt="2023-03-19T18:01:10.702" v="320" actId="6549"/>
-        <pc:sldMkLst>
-          <pc:docMk/>
-          <pc:sldMk cId="3101050196" sldId="761"/>
-        </pc:sldMkLst>
-      </pc:sldChg>
-      <pc:sldChg chg="modNotesTx">
-        <pc:chgData name="Gerth Stølting Brodal" userId="04ef4784-6591-4f86-a140-f5c3b108582a" providerId="ADAL" clId="{49DDEC1E-38A8-4C37-8499-4049F935AE5A}" dt="2023-03-18T02:42:23.457" v="313" actId="20577"/>
-        <pc:sldMkLst>
-          <pc:docMk/>
-          <pc:sldMk cId="907462681" sldId="764"/>
-        </pc:sldMkLst>
-      </pc:sldChg>
-    </pc:docChg>
-  </pc:docChgLst>
-  <pc:docChgLst>
-    <pc:chgData name="Gerth Stølting Brodal" userId="04ef4784-6591-4f86-a140-f5c3b108582a" providerId="ADAL" clId="{A92BEAE8-2EDA-457D-83DA-8465CF1F550C}"/>
-    <pc:docChg chg="custSel modSld">
-      <pc:chgData name="Gerth Stølting Brodal" userId="04ef4784-6591-4f86-a140-f5c3b108582a" providerId="ADAL" clId="{A92BEAE8-2EDA-457D-83DA-8465CF1F550C}" dt="2022-03-22T06:00:45.248" v="55" actId="20577"/>
-      <pc:docMkLst>
-        <pc:docMk/>
-      </pc:docMkLst>
-      <pc:sldChg chg="modSp mod modNotesTx">
-        <pc:chgData name="Gerth Stølting Brodal" userId="04ef4784-6591-4f86-a140-f5c3b108582a" providerId="ADAL" clId="{A92BEAE8-2EDA-457D-83DA-8465CF1F550C}" dt="2022-03-22T06:00:45.248" v="55" actId="20577"/>
-        <pc:sldMkLst>
-          <pc:docMk/>
-          <pc:sldMk cId="907462681" sldId="764"/>
-        </pc:sldMkLst>
-        <pc:graphicFrameChg chg="mod modGraphic">
-          <ac:chgData name="Gerth Stølting Brodal" userId="04ef4784-6591-4f86-a140-f5c3b108582a" providerId="ADAL" clId="{A92BEAE8-2EDA-457D-83DA-8465CF1F550C}" dt="2022-03-20T22:46:39.920" v="28" actId="207"/>
-          <ac:graphicFrameMkLst>
-            <pc:docMk/>
-            <pc:sldMk cId="907462681" sldId="764"/>
-            <ac:graphicFrameMk id="5" creationId="{3C4BA663-435A-4D48-AE4E-2D56112B93E9}"/>
-          </ac:graphicFrameMkLst>
-        </pc:graphicFrameChg>
-      </pc:sldChg>
-    </pc:docChg>
-  </pc:docChgLst>
   <pc:docChgLst>
     <pc:chgData name="Gerth Stølting Brodal" userId="04ef4784-6591-4f86-a140-f5c3b108582a" providerId="ADAL" clId="{FF0607A2-90B5-4D94-9A2D-E7F06D4272F1}"/>
     <pc:docChg chg="modSld">
@@ -302,14 +149,6 @@
           <pc:docMk/>
           <pc:sldMk cId="752883233" sldId="719"/>
         </pc:sldMkLst>
-        <pc:graphicFrameChg chg="modGraphic">
-          <ac:chgData name="Gerth Stølting Brodal" userId="04ef4784-6591-4f86-a140-f5c3b108582a" providerId="ADAL" clId="{FF0607A2-90B5-4D94-9A2D-E7F06D4272F1}" dt="2021-03-24T12:51:53.168" v="12" actId="20577"/>
-          <ac:graphicFrameMkLst>
-            <pc:docMk/>
-            <pc:sldMk cId="752883233" sldId="719"/>
-            <ac:graphicFrameMk id="4" creationId="{00000000-0000-0000-0000-000000000000}"/>
-          </ac:graphicFrameMkLst>
-        </pc:graphicFrameChg>
       </pc:sldChg>
       <pc:sldChg chg="modTransition">
         <pc:chgData name="Gerth Stølting Brodal" userId="04ef4784-6591-4f86-a140-f5c3b108582a" providerId="ADAL" clId="{FF0607A2-90B5-4D94-9A2D-E7F06D4272F1}" dt="2021-03-22T08:51:54.546" v="0"/>
@@ -330,6 +169,126 @@
         <pc:sldMkLst>
           <pc:docMk/>
           <pc:sldMk cId="1665259652" sldId="741"/>
+        </pc:sldMkLst>
+      </pc:sldChg>
+    </pc:docChg>
+  </pc:docChgLst>
+  <pc:docChgLst>
+    <pc:chgData name="Gerth Stølting Brodal" userId="04ef4784-6591-4f86-a140-f5c3b108582a" providerId="ADAL" clId="{49DDEC1E-38A8-4C37-8499-4049F935AE5A}"/>
+    <pc:docChg chg="undo redo custSel modSld">
+      <pc:chgData name="Gerth Stølting Brodal" userId="04ef4784-6591-4f86-a140-f5c3b108582a" providerId="ADAL" clId="{49DDEC1E-38A8-4C37-8499-4049F935AE5A}" dt="2023-03-20T07:23:13.100" v="322" actId="1036"/>
+      <pc:docMkLst>
+        <pc:docMk/>
+      </pc:docMkLst>
+      <pc:sldChg chg="modSp mod modNotesTx">
+        <pc:chgData name="Gerth Stølting Brodal" userId="04ef4784-6591-4f86-a140-f5c3b108582a" providerId="ADAL" clId="{49DDEC1E-38A8-4C37-8499-4049F935AE5A}" dt="2023-03-20T07:23:13.100" v="322" actId="1036"/>
+        <pc:sldMkLst>
+          <pc:docMk/>
+          <pc:sldMk cId="1986006132" sldId="478"/>
+        </pc:sldMkLst>
+      </pc:sldChg>
+      <pc:sldChg chg="modNotesTx">
+        <pc:chgData name="Gerth Stølting Brodal" userId="04ef4784-6591-4f86-a140-f5c3b108582a" providerId="ADAL" clId="{49DDEC1E-38A8-4C37-8499-4049F935AE5A}" dt="2023-03-18T02:06:20.087" v="278" actId="20577"/>
+        <pc:sldMkLst>
+          <pc:docMk/>
+          <pc:sldMk cId="27977411" sldId="742"/>
+        </pc:sldMkLst>
+      </pc:sldChg>
+      <pc:sldChg chg="modSp mod">
+        <pc:chgData name="Gerth Stølting Brodal" userId="04ef4784-6591-4f86-a140-f5c3b108582a" providerId="ADAL" clId="{49DDEC1E-38A8-4C37-8499-4049F935AE5A}" dt="2023-03-10T23:46:02.009" v="21" actId="6549"/>
+        <pc:sldMkLst>
+          <pc:docMk/>
+          <pc:sldMk cId="4266574988" sldId="743"/>
+        </pc:sldMkLst>
+      </pc:sldChg>
+      <pc:sldChg chg="modSp mod">
+        <pc:chgData name="Gerth Stølting Brodal" userId="04ef4784-6591-4f86-a140-f5c3b108582a" providerId="ADAL" clId="{49DDEC1E-38A8-4C37-8499-4049F935AE5A}" dt="2023-03-10T23:48:00.193" v="41" actId="313"/>
+        <pc:sldMkLst>
+          <pc:docMk/>
+          <pc:sldMk cId="2191884848" sldId="753"/>
+        </pc:sldMkLst>
+      </pc:sldChg>
+      <pc:sldChg chg="modSp mod addAnim delAnim">
+        <pc:chgData name="Gerth Stølting Brodal" userId="04ef4784-6591-4f86-a140-f5c3b108582a" providerId="ADAL" clId="{49DDEC1E-38A8-4C37-8499-4049F935AE5A}" dt="2023-03-10T23:46:58.878" v="37" actId="313"/>
+        <pc:sldMkLst>
+          <pc:docMk/>
+          <pc:sldMk cId="276098007" sldId="757"/>
+        </pc:sldMkLst>
+      </pc:sldChg>
+      <pc:sldChg chg="modSp mod">
+        <pc:chgData name="Gerth Stølting Brodal" userId="04ef4784-6591-4f86-a140-f5c3b108582a" providerId="ADAL" clId="{49DDEC1E-38A8-4C37-8499-4049F935AE5A}" dt="2023-03-10T23:55:09.257" v="75" actId="20577"/>
+        <pc:sldMkLst>
+          <pc:docMk/>
+          <pc:sldMk cId="886526213" sldId="759"/>
+        </pc:sldMkLst>
+      </pc:sldChg>
+      <pc:sldChg chg="modNotesTx">
+        <pc:chgData name="Gerth Stølting Brodal" userId="04ef4784-6591-4f86-a140-f5c3b108582a" providerId="ADAL" clId="{49DDEC1E-38A8-4C37-8499-4049F935AE5A}" dt="2023-03-19T18:01:10.702" v="320" actId="6549"/>
+        <pc:sldMkLst>
+          <pc:docMk/>
+          <pc:sldMk cId="3101050196" sldId="761"/>
+        </pc:sldMkLst>
+      </pc:sldChg>
+      <pc:sldChg chg="modNotesTx">
+        <pc:chgData name="Gerth Stølting Brodal" userId="04ef4784-6591-4f86-a140-f5c3b108582a" providerId="ADAL" clId="{49DDEC1E-38A8-4C37-8499-4049F935AE5A}" dt="2023-03-18T02:42:23.457" v="313" actId="20577"/>
+        <pc:sldMkLst>
+          <pc:docMk/>
+          <pc:sldMk cId="907462681" sldId="764"/>
+        </pc:sldMkLst>
+      </pc:sldChg>
+    </pc:docChg>
+  </pc:docChgLst>
+  <pc:docChgLst>
+    <pc:chgData name="Gerth Stølting Brodal" userId="04ef4784-6591-4f86-a140-f5c3b108582a" providerId="ADAL" clId="{C2B8204D-0016-411F-AD09-B5777711474B}"/>
+    <pc:docChg chg="undo custSel modSld">
+      <pc:chgData name="Gerth Stølting Brodal" userId="04ef4784-6591-4f86-a140-f5c3b108582a" providerId="ADAL" clId="{C2B8204D-0016-411F-AD09-B5777711474B}" dt="2025-03-12T19:06:07.315" v="88" actId="20577"/>
+      <pc:docMkLst>
+        <pc:docMk/>
+      </pc:docMkLst>
+      <pc:sldChg chg="modSp mod">
+        <pc:chgData name="Gerth Stølting Brodal" userId="04ef4784-6591-4f86-a140-f5c3b108582a" providerId="ADAL" clId="{C2B8204D-0016-411F-AD09-B5777711474B}" dt="2025-03-12T19:06:07.315" v="88" actId="20577"/>
+        <pc:sldMkLst>
+          <pc:docMk/>
+          <pc:sldMk cId="752883233" sldId="719"/>
+        </pc:sldMkLst>
+        <pc:graphicFrameChg chg="modGraphic">
+          <ac:chgData name="Gerth Stølting Brodal" userId="04ef4784-6591-4f86-a140-f5c3b108582a" providerId="ADAL" clId="{C2B8204D-0016-411F-AD09-B5777711474B}" dt="2025-03-12T19:06:07.315" v="88" actId="20577"/>
+          <ac:graphicFrameMkLst>
+            <pc:docMk/>
+            <pc:sldMk cId="752883233" sldId="719"/>
+            <ac:graphicFrameMk id="4" creationId="{00000000-0000-0000-0000-000000000000}"/>
+          </ac:graphicFrameMkLst>
+        </pc:graphicFrameChg>
+      </pc:sldChg>
+      <pc:sldChg chg="modSp mod addAnim delAnim">
+        <pc:chgData name="Gerth Stølting Brodal" userId="04ef4784-6591-4f86-a140-f5c3b108582a" providerId="ADAL" clId="{C2B8204D-0016-411F-AD09-B5777711474B}" dt="2025-03-12T16:16:06.796" v="87" actId="20577"/>
+        <pc:sldMkLst>
+          <pc:docMk/>
+          <pc:sldMk cId="128484377" sldId="763"/>
+        </pc:sldMkLst>
+        <pc:graphicFrameChg chg="mod modGraphic">
+          <ac:chgData name="Gerth Stølting Brodal" userId="04ef4784-6591-4f86-a140-f5c3b108582a" providerId="ADAL" clId="{C2B8204D-0016-411F-AD09-B5777711474B}" dt="2025-03-12T16:16:06.796" v="87" actId="20577"/>
+          <ac:graphicFrameMkLst>
+            <pc:docMk/>
+            <pc:sldMk cId="128484377" sldId="763"/>
+            <ac:graphicFrameMk id="8" creationId="{00000000-0000-0000-0000-000000000000}"/>
+          </ac:graphicFrameMkLst>
+        </pc:graphicFrameChg>
+      </pc:sldChg>
+    </pc:docChg>
+  </pc:docChgLst>
+  <pc:docChgLst>
+    <pc:chgData name="Gerth Stølting Brodal" userId="04ef4784-6591-4f86-a140-f5c3b108582a" providerId="ADAL" clId="{A92BEAE8-2EDA-457D-83DA-8465CF1F550C}"/>
+    <pc:docChg chg="custSel modSld">
+      <pc:chgData name="Gerth Stølting Brodal" userId="04ef4784-6591-4f86-a140-f5c3b108582a" providerId="ADAL" clId="{A92BEAE8-2EDA-457D-83DA-8465CF1F550C}" dt="2022-03-22T06:00:45.248" v="55" actId="20577"/>
+      <pc:docMkLst>
+        <pc:docMk/>
+      </pc:docMkLst>
+      <pc:sldChg chg="modSp mod modNotesTx">
+        <pc:chgData name="Gerth Stølting Brodal" userId="04ef4784-6591-4f86-a140-f5c3b108582a" providerId="ADAL" clId="{A92BEAE8-2EDA-457D-83DA-8465CF1F550C}" dt="2022-03-22T06:00:45.248" v="55" actId="20577"/>
+        <pc:sldMkLst>
+          <pc:docMk/>
+          <pc:sldMk cId="907462681" sldId="764"/>
         </pc:sldMkLst>
       </pc:sldChg>
     </pc:docChg>
@@ -419,7 +378,7 @@
           <a:p>
             <a:fld id="{FB1A172F-81D4-4DC4-9113-1DBD56EC3646}" type="datetimeFigureOut">
               <a:rPr lang="en-US" smtClean="0"/>
-              <a:t>3/17/2024</a:t>
+              <a:t>3/12/2025</a:t>
             </a:fld>
             <a:endParaRPr lang="en-US"/>
           </a:p>
@@ -2251,7 +2210,7 @@
           <a:p>
             <a:fld id="{0560A9CD-0304-4E0B-9E82-E7E0115DE05B}" type="datetimeFigureOut">
               <a:rPr lang="en-US" smtClean="0"/>
-              <a:t>3/17/2024</a:t>
+              <a:t>3/12/2025</a:t>
             </a:fld>
             <a:endParaRPr lang="en-US"/>
           </a:p>
@@ -2419,7 +2378,7 @@
           <a:p>
             <a:fld id="{0560A9CD-0304-4E0B-9E82-E7E0115DE05B}" type="datetimeFigureOut">
               <a:rPr lang="en-US" smtClean="0"/>
-              <a:t>3/17/2024</a:t>
+              <a:t>3/12/2025</a:t>
             </a:fld>
             <a:endParaRPr lang="en-US"/>
           </a:p>
@@ -2597,7 +2556,7 @@
           <a:p>
             <a:fld id="{0560A9CD-0304-4E0B-9E82-E7E0115DE05B}" type="datetimeFigureOut">
               <a:rPr lang="en-US" smtClean="0"/>
-              <a:t>3/17/2024</a:t>
+              <a:t>3/12/2025</a:t>
             </a:fld>
             <a:endParaRPr lang="en-US"/>
           </a:p>
@@ -2780,7 +2739,7 @@
           <a:p>
             <a:fld id="{0560A9CD-0304-4E0B-9E82-E7E0115DE05B}" type="datetimeFigureOut">
               <a:rPr lang="en-US" smtClean="0"/>
-              <a:t>3/17/2024</a:t>
+              <a:t>3/12/2025</a:t>
             </a:fld>
             <a:endParaRPr lang="en-US"/>
           </a:p>
@@ -3025,7 +2984,7 @@
           <a:p>
             <a:fld id="{0560A9CD-0304-4E0B-9E82-E7E0115DE05B}" type="datetimeFigureOut">
               <a:rPr lang="en-US" smtClean="0"/>
-              <a:t>3/17/2024</a:t>
+              <a:t>3/12/2025</a:t>
             </a:fld>
             <a:endParaRPr lang="en-US"/>
           </a:p>
@@ -3254,7 +3213,7 @@
           <a:p>
             <a:fld id="{0560A9CD-0304-4E0B-9E82-E7E0115DE05B}" type="datetimeFigureOut">
               <a:rPr lang="en-US" smtClean="0"/>
-              <a:t>3/17/2024</a:t>
+              <a:t>3/12/2025</a:t>
             </a:fld>
             <a:endParaRPr lang="en-US"/>
           </a:p>
@@ -3618,7 +3577,7 @@
           <a:p>
             <a:fld id="{0560A9CD-0304-4E0B-9E82-E7E0115DE05B}" type="datetimeFigureOut">
               <a:rPr lang="en-US" smtClean="0"/>
-              <a:t>3/17/2024</a:t>
+              <a:t>3/12/2025</a:t>
             </a:fld>
             <a:endParaRPr lang="en-US"/>
           </a:p>
@@ -3735,7 +3694,7 @@
           <a:p>
             <a:fld id="{0560A9CD-0304-4E0B-9E82-E7E0115DE05B}" type="datetimeFigureOut">
               <a:rPr lang="en-US" smtClean="0"/>
-              <a:t>3/17/2024</a:t>
+              <a:t>3/12/2025</a:t>
             </a:fld>
             <a:endParaRPr lang="en-US"/>
           </a:p>
@@ -3830,7 +3789,7 @@
           <a:p>
             <a:fld id="{0560A9CD-0304-4E0B-9E82-E7E0115DE05B}" type="datetimeFigureOut">
               <a:rPr lang="en-US" smtClean="0"/>
-              <a:t>3/17/2024</a:t>
+              <a:t>3/12/2025</a:t>
             </a:fld>
             <a:endParaRPr lang="en-US"/>
           </a:p>
@@ -4105,7 +4064,7 @@
           <a:p>
             <a:fld id="{0560A9CD-0304-4E0B-9E82-E7E0115DE05B}" type="datetimeFigureOut">
               <a:rPr lang="en-US" smtClean="0"/>
-              <a:t>3/17/2024</a:t>
+              <a:t>3/12/2025</a:t>
             </a:fld>
             <a:endParaRPr lang="en-US"/>
           </a:p>
@@ -4357,7 +4316,7 @@
           <a:p>
             <a:fld id="{0560A9CD-0304-4E0B-9E82-E7E0115DE05B}" type="datetimeFigureOut">
               <a:rPr lang="en-US" smtClean="0"/>
-              <a:t>3/17/2024</a:t>
+              <a:t>3/12/2025</a:t>
             </a:fld>
             <a:endParaRPr lang="en-US"/>
           </a:p>
@@ -4568,7 +4527,7 @@
           <a:p>
             <a:fld id="{0560A9CD-0304-4E0B-9E82-E7E0115DE05B}" type="datetimeFigureOut">
               <a:rPr lang="en-US" smtClean="0"/>
-              <a:t>3/17/2024</a:t>
+              <a:t>3/12/2025</a:t>
             </a:fld>
             <a:endParaRPr lang="en-US"/>
           </a:p>
@@ -14778,14 +14737,14 @@
           <p:nvPr>
             <p:extLst>
               <p:ext uri="{D42A27DB-BD31-4B8C-83A1-F6EECF244321}">
-                <p14:modId xmlns:p14="http://schemas.microsoft.com/office/powerpoint/2010/main" val="4236222948"/>
+                <p14:modId xmlns:p14="http://schemas.microsoft.com/office/powerpoint/2010/main" val="2041876532"/>
               </p:ext>
             </p:extLst>
           </p:nvPr>
         </p:nvGraphicFramePr>
         <p:xfrm>
-          <a:off x="2254885" y="2545698"/>
-          <a:ext cx="7682230" cy="3332410"/>
+          <a:off x="2254885" y="2462568"/>
+          <a:ext cx="7682230" cy="3545770"/>
         </p:xfrm>
         <a:graphic>
           <a:graphicData uri="http://schemas.openxmlformats.org/drawingml/2006/table">
@@ -15388,6 +15347,41 @@
                           <a:cs typeface="Courier New" panose="02070309020205020404" pitchFamily="49" charset="0"/>
                         </a:rPr>
                         <a:t>'Donald Duck'</a:t>
+                      </a:r>
+                    </a:p>
+                    <a:p>
+                      <a:pPr marL="266700" marR="0" lvl="0" indent="-266700" algn="l" defTabSz="914400" rtl="0" eaLnBrk="1" fontAlgn="auto" latinLnBrk="0" hangingPunct="1">
+                        <a:lnSpc>
+                          <a:spcPct val="100000"/>
+                        </a:lnSpc>
+                        <a:spcBef>
+                          <a:spcPts val="0"/>
+                        </a:spcBef>
+                        <a:spcAft>
+                          <a:spcPts val="0"/>
+                        </a:spcAft>
+                        <a:buClr>
+                          <a:srgbClr val="C00000"/>
+                        </a:buClr>
+                        <a:buSzPct val="100000"/>
+                        <a:buFont typeface="Courier New" panose="02070309020205020404" pitchFamily="49" charset="0"/>
+                        <a:buChar char="&gt;"/>
+                        <a:tabLst/>
+                        <a:defRPr/>
+                      </a:pPr>
+                      <a:r>
+                        <a:rPr lang="en-US" sz="1400" b="1" dirty="0" err="1">
+                          <a:latin typeface="Courier New" panose="02070309020205020404" pitchFamily="49" charset="0"/>
+                          <a:cs typeface="Courier New" panose="02070309020205020404" pitchFamily="49" charset="0"/>
+                        </a:rPr>
+                        <a:t>person.height</a:t>
+                      </a:r>
+                      <a:r>
+                        <a:rPr lang="en-US" sz="1400" b="1" dirty="0">
+                          <a:latin typeface="Courier New" panose="02070309020205020404" pitchFamily="49" charset="0"/>
+                          <a:cs typeface="Courier New" panose="02070309020205020404" pitchFamily="49" charset="0"/>
+                        </a:rPr>
+                        <a:t> = '3.5 feet'</a:t>
                       </a:r>
                     </a:p>
                     <a:p>
@@ -15735,7 +15729,7 @@
           <p:nvPr>
             <p:extLst>
               <p:ext uri="{D42A27DB-BD31-4B8C-83A1-F6EECF244321}">
-                <p14:modId xmlns:p14="http://schemas.microsoft.com/office/powerpoint/2010/main" val="2301895491"/>
+                <p14:modId xmlns:p14="http://schemas.microsoft.com/office/powerpoint/2010/main" val="437447744"/>
               </p:ext>
             </p:extLst>
           </p:nvPr>
@@ -15961,21 +15955,7 @@
                           <a:latin typeface="Courier New" panose="02070309020205020404" pitchFamily="49" charset="0"/>
                           <a:cs typeface="Courier New" panose="02070309020205020404" pitchFamily="49" charset="0"/>
                         </a:rPr>
-                        <a:t>    </a:t>
-                      </a:r>
-                      <a:r>
-                        <a:rPr lang="en-US" sz="1600" b="1" dirty="0" err="1">
-                          <a:latin typeface="Courier New" panose="02070309020205020404" pitchFamily="49" charset="0"/>
-                          <a:cs typeface="Courier New" panose="02070309020205020404" pitchFamily="49" charset="0"/>
-                        </a:rPr>
-                        <a:t>def</a:t>
-                      </a:r>
-                      <a:r>
-                        <a:rPr lang="en-US" sz="1600" b="1" dirty="0">
-                          <a:latin typeface="Courier New" panose="02070309020205020404" pitchFamily="49" charset="0"/>
-                          <a:cs typeface="Courier New" panose="02070309020205020404" pitchFamily="49" charset="0"/>
-                        </a:rPr>
-                        <a:t> </a:t>
+                        <a:t>    def </a:t>
                       </a:r>
                       <a:r>
                         <a:rPr lang="en-US" sz="1600" b="1" dirty="0">
@@ -16021,11 +16001,18 @@
                         <a:t>(</a:t>
                       </a:r>
                       <a:r>
-                        <a:rPr lang="en-US" sz="1600" b="1" dirty="0" err="1">
-                          <a:latin typeface="Courier New" panose="02070309020205020404" pitchFamily="49" charset="0"/>
-                          <a:cs typeface="Courier New" panose="02070309020205020404" pitchFamily="49" charset="0"/>
-                        </a:rPr>
-                        <a:t>self,name</a:t>
+                        <a:rPr lang="en-US" sz="1600" b="1" err="1">
+                          <a:latin typeface="Courier New" panose="02070309020205020404" pitchFamily="49" charset="0"/>
+                          <a:cs typeface="Courier New" panose="02070309020205020404" pitchFamily="49" charset="0"/>
+                        </a:rPr>
+                        <a:t>self</a:t>
+                      </a:r>
+                      <a:r>
+                        <a:rPr lang="en-US" sz="1600" b="1">
+                          <a:latin typeface="Courier New" panose="02070309020205020404" pitchFamily="49" charset="0"/>
+                          <a:cs typeface="Courier New" panose="02070309020205020404" pitchFamily="49" charset="0"/>
+                        </a:rPr>
+                        <a:t>, name</a:t>
                       </a:r>
                       <a:r>
                         <a:rPr lang="en-US" sz="1600" b="1" dirty="0">

</xml_diff>